<commit_message>
added info on backlinking and social
</commit_message>
<xml_diff>
--- a/blog_guidelines/Blogging.pptx
+++ b/blog_guidelines/Blogging.pptx
@@ -1,11 +1,11 @@
 
 <file path=ppt/presentation.xml><?xml version="1.0" encoding="utf-8"?>
-<p:presentation xmlns:a="http://schemas.openxmlformats.org/drawingml/2006/main" xmlns:r="http://schemas.openxmlformats.org/officeDocument/2006/relationships" xmlns:p="http://schemas.openxmlformats.org/presentationml/2006/main" strictFirstAndLastChars="0" embedTrueTypeFonts="1" saveSubsetFonts="1" autoCompressPictures="0">
+<p:presentation xmlns:a="http://schemas.openxmlformats.org/drawingml/2006/main" xmlns:r="http://schemas.openxmlformats.org/officeDocument/2006/relationships" xmlns:p="http://schemas.openxmlformats.org/presentationml/2006/main" strictFirstAndLastChars="0" embedTrueTypeFonts="1" autoCompressPictures="0">
   <p:sldMasterIdLst>
     <p:sldMasterId id="2147483659" r:id="rId1"/>
   </p:sldMasterIdLst>
   <p:notesMasterIdLst>
-    <p:notesMasterId r:id="rId11"/>
+    <p:notesMasterId r:id="rId13"/>
   </p:notesMasterIdLst>
   <p:sldIdLst>
     <p:sldId id="256" r:id="rId2"/>
@@ -16,17 +16,19 @@
     <p:sldId id="281" r:id="rId7"/>
     <p:sldId id="284" r:id="rId8"/>
     <p:sldId id="283" r:id="rId9"/>
-    <p:sldId id="275" r:id="rId10"/>
+    <p:sldId id="286" r:id="rId10"/>
+    <p:sldId id="285" r:id="rId11"/>
+    <p:sldId id="275" r:id="rId12"/>
   </p:sldIdLst>
   <p:sldSz cx="9144000" cy="5143500" type="screen16x9"/>
   <p:notesSz cx="6858000" cy="9144000"/>
   <p:embeddedFontLst>
     <p:embeddedFont>
       <p:font typeface="Proxima Nova" panose="02000506030000020004" pitchFamily="2" charset="0"/>
-      <p:regular r:id="rId12"/>
-      <p:bold r:id="rId13"/>
-      <p:italic r:id="rId14"/>
-      <p:boldItalic r:id="rId15"/>
+      <p:regular r:id="rId14"/>
+      <p:bold r:id="rId15"/>
+      <p:italic r:id="rId16"/>
+      <p:boldItalic r:id="rId17"/>
     </p:embeddedFont>
   </p:embeddedFontLst>
   <p:defaultTextStyle>
@@ -825,6 +827,251 @@
 </p:notes>
 </file>
 
+<file path=ppt/notesSlides/notesSlide10.xml><?xml version="1.0" encoding="utf-8"?>
+<p:notes xmlns:a="http://schemas.openxmlformats.org/drawingml/2006/main" xmlns:r="http://schemas.openxmlformats.org/officeDocument/2006/relationships" xmlns:p="http://schemas.openxmlformats.org/presentationml/2006/main" showMasterSp="0" showMasterPhAnim="0">
+  <p:cSld>
+    <p:spTree>
+      <p:nvGrpSpPr>
+        <p:cNvPr id="1" name="Shape 83"/>
+        <p:cNvGrpSpPr/>
+        <p:nvPr/>
+      </p:nvGrpSpPr>
+      <p:grpSpPr>
+        <a:xfrm>
+          <a:off x="0" y="0"/>
+          <a:ext cx="0" cy="0"/>
+          <a:chOff x="0" y="0"/>
+          <a:chExt cx="0" cy="0"/>
+        </a:xfrm>
+      </p:grpSpPr>
+      <p:sp>
+        <p:nvSpPr>
+          <p:cNvPr id="84" name="Google Shape;84;g3d34e4e9f8_3_114:notes"/>
+          <p:cNvSpPr>
+            <a:spLocks noGrp="1" noRot="1" noChangeAspect="1"/>
+          </p:cNvSpPr>
+          <p:nvPr>
+            <p:ph type="sldImg" idx="2"/>
+          </p:nvPr>
+        </p:nvSpPr>
+        <p:spPr>
+          <a:xfrm>
+            <a:off x="381000" y="685800"/>
+            <a:ext cx="6096000" cy="3429000"/>
+          </a:xfrm>
+          <a:custGeom>
+            <a:avLst/>
+            <a:gdLst/>
+            <a:ahLst/>
+            <a:cxnLst/>
+            <a:rect l="l" t="t" r="r" b="b"/>
+            <a:pathLst>
+              <a:path w="120000" h="120000" extrusionOk="0">
+                <a:moveTo>
+                  <a:pt x="0" y="0"/>
+                </a:moveTo>
+                <a:lnTo>
+                  <a:pt x="120000" y="0"/>
+                </a:lnTo>
+                <a:lnTo>
+                  <a:pt x="120000" y="120000"/>
+                </a:lnTo>
+                <a:lnTo>
+                  <a:pt x="0" y="120000"/>
+                </a:lnTo>
+                <a:close/>
+              </a:path>
+            </a:pathLst>
+          </a:custGeom>
+          <a:noFill/>
+          <a:ln w="9525" cap="flat" cmpd="sng">
+            <a:solidFill>
+              <a:srgbClr val="000000"/>
+            </a:solidFill>
+            <a:prstDash val="solid"/>
+            <a:round/>
+            <a:headEnd type="none" w="sm" len="sm"/>
+            <a:tailEnd type="none" w="sm" len="sm"/>
+          </a:ln>
+        </p:spPr>
+      </p:sp>
+      <p:sp>
+        <p:nvSpPr>
+          <p:cNvPr id="85" name="Google Shape;85;g3d34e4e9f8_3_114:notes"/>
+          <p:cNvSpPr txBox="1">
+            <a:spLocks noGrp="1"/>
+          </p:cNvSpPr>
+          <p:nvPr>
+            <p:ph type="body" idx="1"/>
+          </p:nvPr>
+        </p:nvSpPr>
+        <p:spPr>
+          <a:xfrm>
+            <a:off x="685800" y="4343400"/>
+            <a:ext cx="5486400" cy="4114800"/>
+          </a:xfrm>
+          <a:prstGeom prst="rect">
+            <a:avLst/>
+          </a:prstGeom>
+          <a:noFill/>
+          <a:ln>
+            <a:noFill/>
+          </a:ln>
+        </p:spPr>
+        <p:txBody>
+          <a:bodyPr spcFirstLastPara="1" wrap="square" lIns="91425" tIns="91425" rIns="91425" bIns="91425" anchor="t" anchorCtr="0">
+            <a:noAutofit/>
+          </a:bodyPr>
+          <a:lstStyle/>
+          <a:p>
+            <a:pPr marL="0" marR="0" lvl="0" indent="0" algn="l" rtl="0">
+              <a:spcBef>
+                <a:spcPts val="0"/>
+              </a:spcBef>
+              <a:spcAft>
+                <a:spcPts val="0"/>
+              </a:spcAft>
+              <a:buSzPts val="1100"/>
+              <a:buFont typeface="Arial"/>
+              <a:buNone/>
+            </a:pPr>
+            <a:endParaRPr sz="1100" b="0" i="0" u="none" strike="noStrike" cap="none" dirty="0"/>
+          </a:p>
+        </p:txBody>
+      </p:sp>
+    </p:spTree>
+    <p:extLst>
+      <p:ext uri="{BB962C8B-B14F-4D97-AF65-F5344CB8AC3E}">
+        <p14:creationId xmlns:p14="http://schemas.microsoft.com/office/powerpoint/2010/main" val="907770443"/>
+      </p:ext>
+    </p:extLst>
+  </p:cSld>
+  <p:clrMapOvr>
+    <a:masterClrMapping/>
+  </p:clrMapOvr>
+</p:notes>
+</file>
+
+<file path=ppt/notesSlides/notesSlide11.xml><?xml version="1.0" encoding="utf-8"?>
+<p:notes xmlns:a="http://schemas.openxmlformats.org/drawingml/2006/main" xmlns:r="http://schemas.openxmlformats.org/officeDocument/2006/relationships" xmlns:p="http://schemas.openxmlformats.org/presentationml/2006/main" showMasterSp="0" showMasterPhAnim="0">
+  <p:cSld>
+    <p:spTree>
+      <p:nvGrpSpPr>
+        <p:cNvPr id="1" name="Shape 255"/>
+        <p:cNvGrpSpPr/>
+        <p:nvPr/>
+      </p:nvGrpSpPr>
+      <p:grpSpPr>
+        <a:xfrm>
+          <a:off x="0" y="0"/>
+          <a:ext cx="0" cy="0"/>
+          <a:chOff x="0" y="0"/>
+          <a:chExt cx="0" cy="0"/>
+        </a:xfrm>
+      </p:grpSpPr>
+      <p:sp>
+        <p:nvSpPr>
+          <p:cNvPr id="256" name="Google Shape;256;p20:notes"/>
+          <p:cNvSpPr>
+            <a:spLocks noGrp="1" noRot="1" noChangeAspect="1"/>
+          </p:cNvSpPr>
+          <p:nvPr>
+            <p:ph type="sldImg" idx="2"/>
+          </p:nvPr>
+        </p:nvSpPr>
+        <p:spPr>
+          <a:xfrm>
+            <a:off x="381000" y="685800"/>
+            <a:ext cx="6096000" cy="3429000"/>
+          </a:xfrm>
+          <a:custGeom>
+            <a:avLst/>
+            <a:gdLst/>
+            <a:ahLst/>
+            <a:cxnLst/>
+            <a:rect l="l" t="t" r="r" b="b"/>
+            <a:pathLst>
+              <a:path w="120000" h="120000" extrusionOk="0">
+                <a:moveTo>
+                  <a:pt x="0" y="0"/>
+                </a:moveTo>
+                <a:lnTo>
+                  <a:pt x="120000" y="0"/>
+                </a:lnTo>
+                <a:lnTo>
+                  <a:pt x="120000" y="120000"/>
+                </a:lnTo>
+                <a:lnTo>
+                  <a:pt x="0" y="120000"/>
+                </a:lnTo>
+                <a:close/>
+              </a:path>
+            </a:pathLst>
+          </a:custGeom>
+          <a:noFill/>
+          <a:ln w="9525" cap="flat" cmpd="sng">
+            <a:solidFill>
+              <a:srgbClr val="000000"/>
+            </a:solidFill>
+            <a:prstDash val="solid"/>
+            <a:round/>
+            <a:headEnd type="none" w="sm" len="sm"/>
+            <a:tailEnd type="none" w="sm" len="sm"/>
+          </a:ln>
+        </p:spPr>
+      </p:sp>
+      <p:sp>
+        <p:nvSpPr>
+          <p:cNvPr id="257" name="Google Shape;257;p20:notes"/>
+          <p:cNvSpPr txBox="1">
+            <a:spLocks noGrp="1"/>
+          </p:cNvSpPr>
+          <p:nvPr>
+            <p:ph type="body" idx="1"/>
+          </p:nvPr>
+        </p:nvSpPr>
+        <p:spPr>
+          <a:xfrm>
+            <a:off x="685800" y="4343400"/>
+            <a:ext cx="5486400" cy="4114800"/>
+          </a:xfrm>
+          <a:prstGeom prst="rect">
+            <a:avLst/>
+          </a:prstGeom>
+          <a:noFill/>
+          <a:ln>
+            <a:noFill/>
+          </a:ln>
+        </p:spPr>
+        <p:txBody>
+          <a:bodyPr spcFirstLastPara="1" wrap="square" lIns="91425" tIns="91425" rIns="91425" bIns="91425" anchor="t" anchorCtr="0">
+            <a:noAutofit/>
+          </a:bodyPr>
+          <a:lstStyle/>
+          <a:p>
+            <a:pPr marL="0" marR="0" lvl="0" indent="0" algn="l" rtl="0">
+              <a:spcBef>
+                <a:spcPts val="0"/>
+              </a:spcBef>
+              <a:spcAft>
+                <a:spcPts val="0"/>
+              </a:spcAft>
+              <a:buSzPts val="1100"/>
+              <a:buFont typeface="Arial"/>
+              <a:buNone/>
+            </a:pPr>
+            <a:endParaRPr sz="1100" b="0" i="0" u="none" strike="noStrike" cap="none"/>
+          </a:p>
+        </p:txBody>
+      </p:sp>
+    </p:spTree>
+  </p:cSld>
+  <p:clrMapOvr>
+    <a:masterClrMapping/>
+  </p:clrMapOvr>
+</p:notes>
+</file>
+
 <file path=ppt/notesSlides/notesSlide2.xml><?xml version="1.0" encoding="utf-8"?>
 <p:notes xmlns:a="http://schemas.openxmlformats.org/drawingml/2006/main" xmlns:r="http://schemas.openxmlformats.org/officeDocument/2006/relationships" xmlns:p="http://schemas.openxmlformats.org/presentationml/2006/main" showMasterSp="0" showMasterPhAnim="0">
   <p:cSld>
@@ -1851,7 +2098,7 @@
   <p:cSld>
     <p:spTree>
       <p:nvGrpSpPr>
-        <p:cNvPr id="1" name="Shape 255"/>
+        <p:cNvPr id="1" name="Shape 83"/>
         <p:cNvGrpSpPr/>
         <p:nvPr/>
       </p:nvGrpSpPr>
@@ -1865,7 +2112,7 @@
       </p:grpSpPr>
       <p:sp>
         <p:nvSpPr>
-          <p:cNvPr id="256" name="Google Shape;256;p20:notes"/>
+          <p:cNvPr id="84" name="Google Shape;84;g3d34e4e9f8_3_114:notes"/>
           <p:cNvSpPr>
             <a:spLocks noGrp="1" noRot="1" noChangeAspect="1"/>
           </p:cNvSpPr>
@@ -1916,7 +2163,7 @@
       </p:sp>
       <p:sp>
         <p:nvSpPr>
-          <p:cNvPr id="257" name="Google Shape;257;p20:notes"/>
+          <p:cNvPr id="85" name="Google Shape;85;g3d34e4e9f8_3_114:notes"/>
           <p:cNvSpPr txBox="1">
             <a:spLocks noGrp="1"/>
           </p:cNvSpPr>
@@ -1954,11 +2201,16 @@
               <a:buFont typeface="Arial"/>
               <a:buNone/>
             </a:pPr>
-            <a:endParaRPr sz="1100" b="0" i="0" u="none" strike="noStrike" cap="none"/>
+            <a:endParaRPr sz="1100" b="0" i="0" u="none" strike="noStrike" cap="none" dirty="0"/>
           </a:p>
         </p:txBody>
       </p:sp>
     </p:spTree>
+    <p:extLst>
+      <p:ext uri="{BB962C8B-B14F-4D97-AF65-F5344CB8AC3E}">
+        <p14:creationId xmlns:p14="http://schemas.microsoft.com/office/powerpoint/2010/main" val="3396875303"/>
+      </p:ext>
+    </p:extLst>
   </p:cSld>
   <p:clrMapOvr>
     <a:masterClrMapping/>
@@ -11363,6 +11615,638 @@
           <a:ln w="19050" cap="flat" cmpd="sng">
             <a:solidFill>
               <a:srgbClr val="EF3969"/>
+            </a:solidFill>
+            <a:prstDash val="solid"/>
+            <a:round/>
+            <a:headEnd type="none" w="sm" len="sm"/>
+            <a:tailEnd type="none" w="sm" len="sm"/>
+          </a:ln>
+        </p:spPr>
+      </p:cxnSp>
+    </p:spTree>
+  </p:cSld>
+  <p:clrMapOvr>
+    <a:masterClrMapping/>
+  </p:clrMapOvr>
+</p:sld>
+</file>
+
+<file path=ppt/slides/slide10.xml><?xml version="1.0" encoding="utf-8"?>
+<p:sld xmlns:a="http://schemas.openxmlformats.org/drawingml/2006/main" xmlns:r="http://schemas.openxmlformats.org/officeDocument/2006/relationships" xmlns:p="http://schemas.openxmlformats.org/presentationml/2006/main">
+  <p:cSld>
+    <p:bg>
+      <p:bgPr>
+        <a:solidFill>
+          <a:srgbClr val="FFFFFF"/>
+        </a:solidFill>
+        <a:effectLst/>
+      </p:bgPr>
+    </p:bg>
+    <p:spTree>
+      <p:nvGrpSpPr>
+        <p:cNvPr id="1" name="Shape 86"/>
+        <p:cNvGrpSpPr/>
+        <p:nvPr/>
+      </p:nvGrpSpPr>
+      <p:grpSpPr>
+        <a:xfrm>
+          <a:off x="0" y="0"/>
+          <a:ext cx="0" cy="0"/>
+          <a:chOff x="0" y="0"/>
+          <a:chExt cx="0" cy="0"/>
+        </a:xfrm>
+      </p:grpSpPr>
+      <p:sp>
+        <p:nvSpPr>
+          <p:cNvPr id="87" name="Google Shape;87;p16"/>
+          <p:cNvSpPr/>
+          <p:nvPr/>
+        </p:nvSpPr>
+        <p:spPr>
+          <a:xfrm>
+            <a:off x="0" y="0"/>
+            <a:ext cx="9144000" cy="965400"/>
+          </a:xfrm>
+          <a:prstGeom prst="rect">
+            <a:avLst/>
+          </a:prstGeom>
+          <a:solidFill>
+            <a:srgbClr val="EF3969"/>
+          </a:solidFill>
+          <a:ln>
+            <a:noFill/>
+          </a:ln>
+        </p:spPr>
+        <p:txBody>
+          <a:bodyPr spcFirstLastPara="1" wrap="square" lIns="91425" tIns="91425" rIns="91425" bIns="91425" anchor="ctr" anchorCtr="0">
+            <a:noAutofit/>
+          </a:bodyPr>
+          <a:lstStyle/>
+          <a:p>
+            <a:pPr marL="0" marR="0" lvl="0" indent="0" algn="l" rtl="0">
+              <a:lnSpc>
+                <a:spcPct val="100000"/>
+              </a:lnSpc>
+              <a:spcBef>
+                <a:spcPts val="0"/>
+              </a:spcBef>
+              <a:spcAft>
+                <a:spcPts val="0"/>
+              </a:spcAft>
+              <a:buClr>
+                <a:srgbClr val="000000"/>
+              </a:buClr>
+              <a:buSzPts val="1400"/>
+              <a:buFont typeface="Arial"/>
+              <a:buNone/>
+            </a:pPr>
+            <a:endParaRPr sz="1400" b="0" i="0" u="none" strike="noStrike" cap="none">
+              <a:solidFill>
+                <a:srgbClr val="000000"/>
+              </a:solidFill>
+              <a:latin typeface="Arial"/>
+              <a:ea typeface="Arial"/>
+              <a:cs typeface="Arial"/>
+              <a:sym typeface="Arial"/>
+            </a:endParaRPr>
+          </a:p>
+        </p:txBody>
+      </p:sp>
+      <p:sp>
+        <p:nvSpPr>
+          <p:cNvPr id="88" name="Google Shape;88;p16"/>
+          <p:cNvSpPr txBox="1">
+            <a:spLocks noGrp="1"/>
+          </p:cNvSpPr>
+          <p:nvPr>
+            <p:ph type="title"/>
+          </p:nvPr>
+        </p:nvSpPr>
+        <p:spPr>
+          <a:xfrm>
+            <a:off x="311700" y="196350"/>
+            <a:ext cx="6606600" cy="572700"/>
+          </a:xfrm>
+          <a:prstGeom prst="rect">
+            <a:avLst/>
+          </a:prstGeom>
+          <a:noFill/>
+          <a:ln>
+            <a:noFill/>
+          </a:ln>
+        </p:spPr>
+        <p:txBody>
+          <a:bodyPr spcFirstLastPara="1" wrap="square" lIns="91425" tIns="91425" rIns="91425" bIns="91425" anchor="t" anchorCtr="0">
+            <a:noAutofit/>
+          </a:bodyPr>
+          <a:lstStyle/>
+          <a:p>
+            <a:pPr marL="0" marR="0" lvl="0" indent="0" algn="l" rtl="0">
+              <a:lnSpc>
+                <a:spcPct val="100000"/>
+              </a:lnSpc>
+              <a:spcBef>
+                <a:spcPts val="0"/>
+              </a:spcBef>
+              <a:spcAft>
+                <a:spcPts val="0"/>
+              </a:spcAft>
+              <a:buClr>
+                <a:schemeClr val="dk1"/>
+              </a:buClr>
+              <a:buSzPts val="2800"/>
+              <a:buFont typeface="Proxima Nova"/>
+              <a:buNone/>
+            </a:pPr>
+            <a:r>
+              <a:rPr lang="en-US" sz="2800" b="1" i="0" u="none" strike="noStrike" cap="none" dirty="0">
+                <a:solidFill>
+                  <a:srgbClr val="FFFFFF"/>
+                </a:solidFill>
+                <a:latin typeface="Proxima Nova"/>
+                <a:ea typeface="Proxima Nova"/>
+                <a:cs typeface="Proxima Nova"/>
+                <a:sym typeface="Proxima Nova"/>
+              </a:rPr>
+              <a:t>Expanding Your Reach: Share on Social</a:t>
+            </a:r>
+            <a:endParaRPr dirty="0"/>
+          </a:p>
+        </p:txBody>
+      </p:sp>
+      <p:sp>
+        <p:nvSpPr>
+          <p:cNvPr id="89" name="Google Shape;89;p16"/>
+          <p:cNvSpPr txBox="1">
+            <a:spLocks noGrp="1"/>
+          </p:cNvSpPr>
+          <p:nvPr>
+            <p:ph type="body" idx="1"/>
+          </p:nvPr>
+        </p:nvSpPr>
+        <p:spPr>
+          <a:xfrm>
+            <a:off x="311700" y="1394234"/>
+            <a:ext cx="6052886" cy="3275420"/>
+          </a:xfrm>
+          <a:prstGeom prst="rect">
+            <a:avLst/>
+          </a:prstGeom>
+          <a:noFill/>
+          <a:ln>
+            <a:noFill/>
+          </a:ln>
+        </p:spPr>
+        <p:txBody>
+          <a:bodyPr spcFirstLastPara="1" wrap="square" lIns="91425" tIns="91425" rIns="91425" bIns="91425" anchor="t" anchorCtr="0">
+            <a:noAutofit/>
+          </a:bodyPr>
+          <a:lstStyle/>
+          <a:p>
+            <a:pPr marL="76200" marR="0" lvl="0" indent="0" algn="l" rtl="0">
+              <a:lnSpc>
+                <a:spcPct val="115000"/>
+              </a:lnSpc>
+              <a:spcBef>
+                <a:spcPts val="0"/>
+              </a:spcBef>
+              <a:spcAft>
+                <a:spcPts val="0"/>
+              </a:spcAft>
+              <a:buClr>
+                <a:srgbClr val="434343"/>
+              </a:buClr>
+              <a:buSzPts val="2400"/>
+            </a:pPr>
+            <a:r>
+              <a:rPr lang="en-US" sz="2400" dirty="0">
+                <a:solidFill>
+                  <a:srgbClr val="434343"/>
+                </a:solidFill>
+                <a:latin typeface="Proxima Nova"/>
+                <a:sym typeface="Proxima Nova"/>
+              </a:rPr>
+              <a:t>Sharing your blog posts on social media is a great way to reach a wider audience</a:t>
+            </a:r>
+          </a:p>
+          <a:p>
+            <a:pPr marL="76200" marR="0" lvl="0" indent="0" algn="l" rtl="0">
+              <a:lnSpc>
+                <a:spcPct val="115000"/>
+              </a:lnSpc>
+              <a:spcBef>
+                <a:spcPts val="0"/>
+              </a:spcBef>
+              <a:spcAft>
+                <a:spcPts val="0"/>
+              </a:spcAft>
+              <a:buClr>
+                <a:srgbClr val="434343"/>
+              </a:buClr>
+              <a:buSzPts val="2400"/>
+            </a:pPr>
+            <a:endParaRPr lang="en-US" sz="2400" dirty="0">
+              <a:solidFill>
+                <a:srgbClr val="434343"/>
+              </a:solidFill>
+              <a:latin typeface="Proxima Nova"/>
+              <a:sym typeface="Proxima Nova"/>
+            </a:endParaRPr>
+          </a:p>
+          <a:p>
+            <a:pPr marL="76200" marR="0" lvl="0" indent="0" algn="l" rtl="0">
+              <a:lnSpc>
+                <a:spcPct val="115000"/>
+              </a:lnSpc>
+              <a:spcBef>
+                <a:spcPts val="0"/>
+              </a:spcBef>
+              <a:spcAft>
+                <a:spcPts val="0"/>
+              </a:spcAft>
+              <a:buClr>
+                <a:srgbClr val="434343"/>
+              </a:buClr>
+              <a:buSzPts val="2400"/>
+            </a:pPr>
+            <a:r>
+              <a:rPr lang="en-US" sz="2400" dirty="0">
+                <a:solidFill>
+                  <a:srgbClr val="434343"/>
+                </a:solidFill>
+                <a:latin typeface="Proxima Nova"/>
+                <a:sym typeface="Proxima Nova"/>
+              </a:rPr>
+              <a:t>Also, we love sharing our students’ projects with our community on twitter</a:t>
+            </a:r>
+          </a:p>
+          <a:p>
+            <a:pPr marL="876300" lvl="1" indent="-342900">
+              <a:spcBef>
+                <a:spcPts val="0"/>
+              </a:spcBef>
+              <a:buClr>
+                <a:srgbClr val="434343"/>
+              </a:buClr>
+              <a:buSzPts val="2400"/>
+              <a:buFont typeface="Arial" panose="020B0604020202020204" pitchFamily="34" charset="0"/>
+              <a:buChar char="•"/>
+            </a:pPr>
+            <a:r>
+              <a:rPr lang="en-US" sz="2000" dirty="0">
+                <a:solidFill>
+                  <a:srgbClr val="434343"/>
+                </a:solidFill>
+                <a:latin typeface="Proxima Nova"/>
+                <a:sym typeface="Proxima Nova"/>
+              </a:rPr>
+              <a:t>Mention us @</a:t>
+            </a:r>
+            <a:r>
+              <a:rPr lang="en-US" sz="2000" dirty="0" err="1">
+                <a:solidFill>
+                  <a:srgbClr val="434343"/>
+                </a:solidFill>
+                <a:latin typeface="Proxima Nova"/>
+                <a:sym typeface="Proxima Nova"/>
+              </a:rPr>
+              <a:t>thisismetis</a:t>
+            </a:r>
+            <a:endParaRPr lang="en-US" sz="2000" dirty="0">
+              <a:solidFill>
+                <a:srgbClr val="434343"/>
+              </a:solidFill>
+              <a:latin typeface="Proxima Nova"/>
+              <a:sym typeface="Proxima Nova"/>
+            </a:endParaRPr>
+          </a:p>
+          <a:p>
+            <a:pPr marL="876300" lvl="1" indent="-342900">
+              <a:spcBef>
+                <a:spcPts val="0"/>
+              </a:spcBef>
+              <a:buClr>
+                <a:srgbClr val="434343"/>
+              </a:buClr>
+              <a:buSzPts val="2400"/>
+              <a:buFont typeface="Arial" panose="020B0604020202020204" pitchFamily="34" charset="0"/>
+              <a:buChar char="•"/>
+            </a:pPr>
+            <a:r>
+              <a:rPr lang="en-US" sz="2000" dirty="0">
+                <a:solidFill>
+                  <a:srgbClr val="434343"/>
+                </a:solidFill>
+                <a:latin typeface="Proxima Nova"/>
+                <a:sym typeface="Proxima Nova"/>
+              </a:rPr>
+              <a:t>Use the #</a:t>
+            </a:r>
+            <a:r>
+              <a:rPr lang="en-US" sz="2000" dirty="0" err="1">
+                <a:solidFill>
+                  <a:srgbClr val="434343"/>
+                </a:solidFill>
+                <a:latin typeface="Proxima Nova"/>
+                <a:sym typeface="Proxima Nova"/>
+              </a:rPr>
+              <a:t>MadeAtMetis</a:t>
+            </a:r>
+            <a:r>
+              <a:rPr lang="en-US" sz="2000" dirty="0">
+                <a:solidFill>
+                  <a:srgbClr val="434343"/>
+                </a:solidFill>
+                <a:latin typeface="Proxima Nova"/>
+                <a:sym typeface="Proxima Nova"/>
+              </a:rPr>
+              <a:t> hashtag</a:t>
+            </a:r>
+          </a:p>
+          <a:p>
+            <a:pPr marL="76200" marR="0" lvl="0" indent="0" algn="l" rtl="0">
+              <a:lnSpc>
+                <a:spcPct val="115000"/>
+              </a:lnSpc>
+              <a:spcBef>
+                <a:spcPts val="0"/>
+              </a:spcBef>
+              <a:spcAft>
+                <a:spcPts val="0"/>
+              </a:spcAft>
+              <a:buClr>
+                <a:srgbClr val="434343"/>
+              </a:buClr>
+              <a:buSzPts val="2400"/>
+            </a:pPr>
+            <a:endParaRPr lang="en-US" sz="2400" dirty="0">
+              <a:solidFill>
+                <a:srgbClr val="434343"/>
+              </a:solidFill>
+              <a:latin typeface="Proxima Nova"/>
+              <a:sym typeface="Proxima Nova"/>
+            </a:endParaRPr>
+          </a:p>
+        </p:txBody>
+      </p:sp>
+      <p:pic>
+        <p:nvPicPr>
+          <p:cNvPr id="90" name="Google Shape;90;p16" descr="metis-mini.png"/>
+          <p:cNvPicPr preferRelativeResize="0"/>
+          <p:nvPr/>
+        </p:nvPicPr>
+        <p:blipFill rotWithShape="1">
+          <a:blip r:embed="rId3">
+            <a:alphaModFix amt="25000"/>
+          </a:blip>
+          <a:srcRect/>
+          <a:stretch/>
+        </p:blipFill>
+        <p:spPr>
+          <a:xfrm>
+            <a:off x="8512774" y="290199"/>
+            <a:ext cx="326424" cy="384999"/>
+          </a:xfrm>
+          <a:prstGeom prst="rect">
+            <a:avLst/>
+          </a:prstGeom>
+          <a:noFill/>
+          <a:ln>
+            <a:noFill/>
+          </a:ln>
+        </p:spPr>
+      </p:pic>
+      <p:pic>
+        <p:nvPicPr>
+          <p:cNvPr id="3" name="Picture 2">
+            <a:extLst>
+              <a:ext uri="{FF2B5EF4-FFF2-40B4-BE49-F238E27FC236}">
+                <a16:creationId xmlns:a16="http://schemas.microsoft.com/office/drawing/2014/main" id="{8BE2054A-DA6A-DB49-8DA6-26DEC5147596}"/>
+              </a:ext>
+            </a:extLst>
+          </p:cNvPr>
+          <p:cNvPicPr>
+            <a:picLocks noChangeAspect="1"/>
+          </p:cNvPicPr>
+          <p:nvPr/>
+        </p:nvPicPr>
+        <p:blipFill>
+          <a:blip r:embed="rId4"/>
+          <a:stretch>
+            <a:fillRect/>
+          </a:stretch>
+        </p:blipFill>
+        <p:spPr>
+          <a:xfrm>
+            <a:off x="6798772" y="1660217"/>
+            <a:ext cx="1820504" cy="1019483"/>
+          </a:xfrm>
+          <a:prstGeom prst="rect">
+            <a:avLst/>
+          </a:prstGeom>
+        </p:spPr>
+      </p:pic>
+      <p:pic>
+        <p:nvPicPr>
+          <p:cNvPr id="4" name="Picture 3">
+            <a:extLst>
+              <a:ext uri="{FF2B5EF4-FFF2-40B4-BE49-F238E27FC236}">
+                <a16:creationId xmlns:a16="http://schemas.microsoft.com/office/drawing/2014/main" id="{F9C57457-48D4-A14E-B4C5-3A7674640580}"/>
+              </a:ext>
+            </a:extLst>
+          </p:cNvPr>
+          <p:cNvPicPr>
+            <a:picLocks noChangeAspect="1"/>
+          </p:cNvPicPr>
+          <p:nvPr/>
+        </p:nvPicPr>
+        <p:blipFill>
+          <a:blip r:embed="rId5"/>
+          <a:stretch>
+            <a:fillRect/>
+          </a:stretch>
+        </p:blipFill>
+        <p:spPr>
+          <a:xfrm>
+            <a:off x="6642165" y="3031944"/>
+            <a:ext cx="2133718" cy="1598229"/>
+          </a:xfrm>
+          <a:prstGeom prst="rect">
+            <a:avLst/>
+          </a:prstGeom>
+        </p:spPr>
+      </p:pic>
+    </p:spTree>
+    <p:extLst>
+      <p:ext uri="{BB962C8B-B14F-4D97-AF65-F5344CB8AC3E}">
+        <p14:creationId xmlns:p14="http://schemas.microsoft.com/office/powerpoint/2010/main" val="2916555702"/>
+      </p:ext>
+    </p:extLst>
+  </p:cSld>
+  <p:clrMapOvr>
+    <a:masterClrMapping/>
+  </p:clrMapOvr>
+</p:sld>
+</file>
+
+<file path=ppt/slides/slide11.xml><?xml version="1.0" encoding="utf-8"?>
+<p:sld xmlns:a="http://schemas.openxmlformats.org/drawingml/2006/main" xmlns:r="http://schemas.openxmlformats.org/officeDocument/2006/relationships" xmlns:p="http://schemas.openxmlformats.org/presentationml/2006/main">
+  <p:cSld>
+    <p:bg>
+      <p:bgPr>
+        <a:solidFill>
+          <a:srgbClr val="EF3969"/>
+        </a:solidFill>
+        <a:effectLst/>
+      </p:bgPr>
+    </p:bg>
+    <p:spTree>
+      <p:nvGrpSpPr>
+        <p:cNvPr id="1" name="Shape 258"/>
+        <p:cNvGrpSpPr/>
+        <p:nvPr/>
+      </p:nvGrpSpPr>
+      <p:grpSpPr>
+        <a:xfrm>
+          <a:off x="0" y="0"/>
+          <a:ext cx="0" cy="0"/>
+          <a:chOff x="0" y="0"/>
+          <a:chExt cx="0" cy="0"/>
+        </a:xfrm>
+      </p:grpSpPr>
+      <p:pic>
+        <p:nvPicPr>
+          <p:cNvPr id="259" name="Google Shape;259;p32" descr="METIS-BLACK.png"/>
+          <p:cNvPicPr preferRelativeResize="0"/>
+          <p:nvPr/>
+        </p:nvPicPr>
+        <p:blipFill rotWithShape="1">
+          <a:blip r:embed="rId3">
+            <a:alphaModFix amt="5000"/>
+          </a:blip>
+          <a:srcRect/>
+          <a:stretch/>
+        </p:blipFill>
+        <p:spPr>
+          <a:xfrm>
+            <a:off x="2539559" y="0"/>
+            <a:ext cx="4064880" cy="5143500"/>
+          </a:xfrm>
+          <a:prstGeom prst="rect">
+            <a:avLst/>
+          </a:prstGeom>
+          <a:noFill/>
+          <a:ln>
+            <a:noFill/>
+          </a:ln>
+        </p:spPr>
+      </p:pic>
+      <p:sp>
+        <p:nvSpPr>
+          <p:cNvPr id="260" name="Google Shape;260;p32"/>
+          <p:cNvSpPr txBox="1">
+            <a:spLocks noGrp="1"/>
+          </p:cNvSpPr>
+          <p:nvPr>
+            <p:ph type="title"/>
+          </p:nvPr>
+        </p:nvSpPr>
+        <p:spPr>
+          <a:xfrm>
+            <a:off x="311700" y="1984125"/>
+            <a:ext cx="8520600" cy="1229700"/>
+          </a:xfrm>
+          <a:prstGeom prst="rect">
+            <a:avLst/>
+          </a:prstGeom>
+          <a:noFill/>
+          <a:ln>
+            <a:noFill/>
+          </a:ln>
+        </p:spPr>
+        <p:txBody>
+          <a:bodyPr spcFirstLastPara="1" wrap="square" lIns="91425" tIns="91425" rIns="91425" bIns="91425" anchor="t" anchorCtr="0">
+            <a:noAutofit/>
+          </a:bodyPr>
+          <a:lstStyle/>
+          <a:p>
+            <a:pPr marL="0" marR="0" lvl="0" indent="0" algn="ctr" rtl="0">
+              <a:lnSpc>
+                <a:spcPct val="100000"/>
+              </a:lnSpc>
+              <a:spcBef>
+                <a:spcPts val="0"/>
+              </a:spcBef>
+              <a:spcAft>
+                <a:spcPts val="0"/>
+              </a:spcAft>
+              <a:buClr>
+                <a:schemeClr val="dk1"/>
+              </a:buClr>
+              <a:buSzPts val="6000"/>
+              <a:buFont typeface="Proxima Nova"/>
+              <a:buNone/>
+            </a:pPr>
+            <a:r>
+              <a:rPr lang="en" sz="6000" b="1" i="0" u="none" strike="noStrike" cap="none">
+                <a:solidFill>
+                  <a:schemeClr val="dk1"/>
+                </a:solidFill>
+                <a:latin typeface="Proxima Nova"/>
+                <a:ea typeface="Proxima Nova"/>
+                <a:cs typeface="Proxima Nova"/>
+                <a:sym typeface="Proxima Nova"/>
+              </a:rPr>
+              <a:t>QUESTIONS?</a:t>
+            </a:r>
+            <a:endParaRPr/>
+          </a:p>
+        </p:txBody>
+      </p:sp>
+      <p:cxnSp>
+        <p:nvCxnSpPr>
+          <p:cNvPr id="261" name="Google Shape;261;p32"/>
+          <p:cNvCxnSpPr/>
+          <p:nvPr/>
+        </p:nvCxnSpPr>
+        <p:spPr>
+          <a:xfrm>
+            <a:off x="1213950" y="3619650"/>
+            <a:ext cx="6716100" cy="0"/>
+          </a:xfrm>
+          <a:prstGeom prst="straightConnector1">
+            <a:avLst/>
+          </a:prstGeom>
+          <a:noFill/>
+          <a:ln w="19050" cap="flat" cmpd="sng">
+            <a:solidFill>
+              <a:srgbClr val="FFFFFF"/>
+            </a:solidFill>
+            <a:prstDash val="solid"/>
+            <a:round/>
+            <a:headEnd type="none" w="sm" len="sm"/>
+            <a:tailEnd type="none" w="sm" len="sm"/>
+          </a:ln>
+        </p:spPr>
+      </p:cxnSp>
+      <p:cxnSp>
+        <p:nvCxnSpPr>
+          <p:cNvPr id="262" name="Google Shape;262;p32"/>
+          <p:cNvCxnSpPr/>
+          <p:nvPr/>
+        </p:nvCxnSpPr>
+        <p:spPr>
+          <a:xfrm>
+            <a:off x="1213950" y="1454600"/>
+            <a:ext cx="6716100" cy="0"/>
+          </a:xfrm>
+          <a:prstGeom prst="straightConnector1">
+            <a:avLst/>
+          </a:prstGeom>
+          <a:noFill/>
+          <a:ln w="19050" cap="flat" cmpd="sng">
+            <a:solidFill>
+              <a:srgbClr val="FFFFFF"/>
             </a:solidFill>
             <a:prstDash val="solid"/>
             <a:round/>
@@ -15652,14 +16536,14 @@
     <p:bg>
       <p:bgPr>
         <a:solidFill>
-          <a:srgbClr val="EF3969"/>
+          <a:srgbClr val="FFFFFF"/>
         </a:solidFill>
         <a:effectLst/>
       </p:bgPr>
     </p:bg>
     <p:spTree>
       <p:nvGrpSpPr>
-        <p:cNvPr id="1" name="Shape 258"/>
+        <p:cNvPr id="1" name="Shape 86"/>
         <p:cNvGrpSpPr/>
         <p:nvPr/>
       </p:nvGrpSpPr>
@@ -15671,36 +16555,65 @@
           <a:chExt cx="0" cy="0"/>
         </a:xfrm>
       </p:grpSpPr>
-      <p:pic>
-        <p:nvPicPr>
-          <p:cNvPr id="259" name="Google Shape;259;p32" descr="METIS-BLACK.png"/>
-          <p:cNvPicPr preferRelativeResize="0"/>
+      <p:sp>
+        <p:nvSpPr>
+          <p:cNvPr id="87" name="Google Shape;87;p16"/>
+          <p:cNvSpPr/>
           <p:nvPr/>
-        </p:nvPicPr>
-        <p:blipFill rotWithShape="1">
-          <a:blip r:embed="rId3">
-            <a:alphaModFix amt="5000"/>
-          </a:blip>
-          <a:srcRect/>
-          <a:stretch/>
-        </p:blipFill>
+        </p:nvSpPr>
         <p:spPr>
           <a:xfrm>
-            <a:off x="2539559" y="0"/>
-            <a:ext cx="4064880" cy="5143500"/>
+            <a:off x="0" y="0"/>
+            <a:ext cx="9144000" cy="965400"/>
           </a:xfrm>
           <a:prstGeom prst="rect">
             <a:avLst/>
           </a:prstGeom>
-          <a:noFill/>
+          <a:solidFill>
+            <a:srgbClr val="EF3969"/>
+          </a:solidFill>
           <a:ln>
             <a:noFill/>
           </a:ln>
         </p:spPr>
-      </p:pic>
+        <p:txBody>
+          <a:bodyPr spcFirstLastPara="1" wrap="square" lIns="91425" tIns="91425" rIns="91425" bIns="91425" anchor="ctr" anchorCtr="0">
+            <a:noAutofit/>
+          </a:bodyPr>
+          <a:lstStyle/>
+          <a:p>
+            <a:pPr marL="0" marR="0" lvl="0" indent="0" algn="l" rtl="0">
+              <a:lnSpc>
+                <a:spcPct val="100000"/>
+              </a:lnSpc>
+              <a:spcBef>
+                <a:spcPts val="0"/>
+              </a:spcBef>
+              <a:spcAft>
+                <a:spcPts val="0"/>
+              </a:spcAft>
+              <a:buClr>
+                <a:srgbClr val="000000"/>
+              </a:buClr>
+              <a:buSzPts val="1400"/>
+              <a:buFont typeface="Arial"/>
+              <a:buNone/>
+            </a:pPr>
+            <a:endParaRPr sz="1400" b="0" i="0" u="none" strike="noStrike" cap="none">
+              <a:solidFill>
+                <a:srgbClr val="000000"/>
+              </a:solidFill>
+              <a:latin typeface="Arial"/>
+              <a:ea typeface="Arial"/>
+              <a:cs typeface="Arial"/>
+              <a:sym typeface="Arial"/>
+            </a:endParaRPr>
+          </a:p>
+        </p:txBody>
+      </p:sp>
       <p:sp>
         <p:nvSpPr>
-          <p:cNvPr id="260" name="Google Shape;260;p32"/>
+          <p:cNvPr id="88" name="Google Shape;88;p16"/>
           <p:cNvSpPr txBox="1">
             <a:spLocks noGrp="1"/>
           </p:cNvSpPr>
@@ -15710,8 +16623,8 @@
         </p:nvSpPr>
         <p:spPr>
           <a:xfrm>
-            <a:off x="311700" y="1984125"/>
-            <a:ext cx="8520600" cy="1229700"/>
+            <a:off x="311700" y="196350"/>
+            <a:ext cx="6606600" cy="572700"/>
           </a:xfrm>
           <a:prstGeom prst="rect">
             <a:avLst/>
@@ -15727,7 +16640,7 @@
           </a:bodyPr>
           <a:lstStyle/>
           <a:p>
-            <a:pPr marL="0" marR="0" lvl="0" indent="0" algn="ctr" rtl="0">
+            <a:pPr marL="0" marR="0" lvl="0" indent="0" algn="l" rtl="0">
               <a:lnSpc>
                 <a:spcPct val="100000"/>
               </a:lnSpc>
@@ -15740,79 +16653,249 @@
               <a:buClr>
                 <a:schemeClr val="dk1"/>
               </a:buClr>
-              <a:buSzPts val="6000"/>
+              <a:buSzPts val="2800"/>
               <a:buFont typeface="Proxima Nova"/>
               <a:buNone/>
             </a:pPr>
             <a:r>
-              <a:rPr lang="en" sz="6000" b="1" i="0" u="none" strike="noStrike" cap="none">
-                <a:solidFill>
-                  <a:schemeClr val="dk1"/>
+              <a:rPr lang="en-US" sz="2800" b="1" i="0" u="none" strike="noStrike" cap="none" dirty="0">
+                <a:solidFill>
+                  <a:srgbClr val="FFFFFF"/>
                 </a:solidFill>
                 <a:latin typeface="Proxima Nova"/>
                 <a:ea typeface="Proxima Nova"/>
                 <a:cs typeface="Proxima Nova"/>
                 <a:sym typeface="Proxima Nova"/>
               </a:rPr>
-              <a:t>QUESTIONS?</a:t>
+              <a:t>Expanding Your Reach: Backlinking</a:t>
             </a:r>
-            <a:endParaRPr/>
+            <a:endParaRPr dirty="0"/>
           </a:p>
         </p:txBody>
       </p:sp>
-      <p:cxnSp>
-        <p:nvCxnSpPr>
-          <p:cNvPr id="261" name="Google Shape;261;p32"/>
-          <p:cNvCxnSpPr/>
-          <p:nvPr/>
-        </p:nvCxnSpPr>
+      <p:sp>
+        <p:nvSpPr>
+          <p:cNvPr id="89" name="Google Shape;89;p16"/>
+          <p:cNvSpPr txBox="1">
+            <a:spLocks noGrp="1"/>
+          </p:cNvSpPr>
+          <p:nvPr>
+            <p:ph type="body" idx="1"/>
+          </p:nvPr>
+        </p:nvSpPr>
         <p:spPr>
           <a:xfrm>
-            <a:off x="1213950" y="3619650"/>
-            <a:ext cx="6716100" cy="0"/>
+            <a:off x="311700" y="1041154"/>
+            <a:ext cx="6931072" cy="3965414"/>
           </a:xfrm>
-          <a:prstGeom prst="straightConnector1">
+          <a:prstGeom prst="rect">
             <a:avLst/>
           </a:prstGeom>
           <a:noFill/>
-          <a:ln w="19050" cap="flat" cmpd="sng">
-            <a:solidFill>
-              <a:srgbClr val="FFFFFF"/>
-            </a:solidFill>
-            <a:prstDash val="solid"/>
-            <a:round/>
-            <a:headEnd type="none" w="sm" len="sm"/>
-            <a:tailEnd type="none" w="sm" len="sm"/>
+          <a:ln>
+            <a:noFill/>
           </a:ln>
         </p:spPr>
-      </p:cxnSp>
-      <p:cxnSp>
-        <p:nvCxnSpPr>
-          <p:cNvPr id="262" name="Google Shape;262;p32"/>
-          <p:cNvCxnSpPr/>
+        <p:txBody>
+          <a:bodyPr spcFirstLastPara="1" wrap="square" lIns="91425" tIns="91425" rIns="91425" bIns="91425" anchor="t" anchorCtr="0">
+            <a:noAutofit/>
+          </a:bodyPr>
+          <a:lstStyle/>
+          <a:p>
+            <a:pPr marL="76200" lvl="0" indent="0">
+              <a:buClr>
+                <a:srgbClr val="434343"/>
+              </a:buClr>
+              <a:buSzPts val="2400"/>
+            </a:pPr>
+            <a:r>
+              <a:rPr lang="en-US" sz="2200" dirty="0">
+                <a:solidFill>
+                  <a:srgbClr val="434343"/>
+                </a:solidFill>
+                <a:latin typeface="Proxima Nova"/>
+                <a:sym typeface="Proxima Nova"/>
+              </a:rPr>
+              <a:t>Backlinking when mentioning Metis in your project blog posts is an easy way to add validity to your educational experience and your expertise. It also helps future students find us more easily in search engines. A win-win!</a:t>
+            </a:r>
+          </a:p>
+          <a:p>
+            <a:pPr marL="76200" lvl="0" indent="0">
+              <a:buClr>
+                <a:srgbClr val="434343"/>
+              </a:buClr>
+              <a:buSzPts val="2400"/>
+            </a:pPr>
+            <a:endParaRPr lang="en-US" sz="2200" dirty="0">
+              <a:solidFill>
+                <a:srgbClr val="434343"/>
+              </a:solidFill>
+              <a:latin typeface="Proxima Nova"/>
+              <a:sym typeface="Proxima Nova"/>
+            </a:endParaRPr>
+          </a:p>
+          <a:p>
+            <a:pPr marL="76200" lvl="0" indent="0">
+              <a:buClr>
+                <a:srgbClr val="434343"/>
+              </a:buClr>
+              <a:buSzPts val="2400"/>
+            </a:pPr>
+            <a:r>
+              <a:rPr lang="en-US" sz="2200" dirty="0">
+                <a:solidFill>
+                  <a:srgbClr val="434343"/>
+                </a:solidFill>
+                <a:latin typeface="Proxima Nova"/>
+                <a:sym typeface="Proxima Nova"/>
+              </a:rPr>
+              <a:t>When mentioning Metis in a post, please link to your specific program page, with </a:t>
+            </a:r>
+            <a:r>
+              <a:rPr lang="en-US" sz="2200" dirty="0">
+                <a:solidFill>
+                  <a:srgbClr val="434343"/>
+                </a:solidFill>
+                <a:latin typeface="Proxima Nova"/>
+                <a:sym typeface="Proxima Nova"/>
+                <a:hlinkClick r:id="rId3"/>
+              </a:rPr>
+              <a:t>Metis</a:t>
+            </a:r>
+            <a:r>
+              <a:rPr lang="en-US" sz="2200" dirty="0">
+                <a:solidFill>
+                  <a:srgbClr val="434343"/>
+                </a:solidFill>
+                <a:latin typeface="Proxima Nova"/>
+                <a:sym typeface="Proxima Nova"/>
+              </a:rPr>
+              <a:t> hyperlinked </a:t>
+            </a:r>
+          </a:p>
+          <a:p>
+            <a:pPr marL="419100" lvl="0" indent="-342900">
+              <a:buClr>
+                <a:srgbClr val="434343"/>
+              </a:buClr>
+              <a:buSzPts val="2400"/>
+              <a:buFont typeface="Arial" panose="020B0604020202020204" pitchFamily="34" charset="0"/>
+              <a:buChar char="•"/>
+            </a:pPr>
+            <a:r>
+              <a:rPr lang="en-US" dirty="0">
+                <a:hlinkClick r:id="rId4"/>
+              </a:rPr>
+              <a:t>Data Analytics</a:t>
+            </a:r>
+            <a:r>
+              <a:rPr lang="en-US" dirty="0"/>
+              <a:t>, </a:t>
+            </a:r>
+            <a:r>
+              <a:rPr lang="en-US" dirty="0">
+                <a:hlinkClick r:id="rId5"/>
+              </a:rPr>
+              <a:t>Data Science</a:t>
+            </a:r>
+            <a:r>
+              <a:rPr lang="en-US" dirty="0"/>
+              <a:t>, </a:t>
+            </a:r>
+            <a:r>
+              <a:rPr lang="en-US" dirty="0">
+                <a:hlinkClick r:id="rId6"/>
+              </a:rPr>
+              <a:t>Data Science and Engineering</a:t>
+            </a:r>
+            <a:r>
+              <a:rPr lang="en-US" dirty="0"/>
+              <a:t>, </a:t>
+            </a:r>
+            <a:r>
+              <a:rPr lang="en-US" dirty="0">
+                <a:hlinkClick r:id="rId3"/>
+              </a:rPr>
+              <a:t>Data Science and Machine Learning</a:t>
+            </a:r>
+            <a:endParaRPr lang="en-US" dirty="0">
+              <a:solidFill>
+                <a:srgbClr val="434343"/>
+              </a:solidFill>
+              <a:latin typeface="Proxima Nova"/>
+              <a:sym typeface="Proxima Nova"/>
+            </a:endParaRPr>
+          </a:p>
+        </p:txBody>
+      </p:sp>
+      <p:pic>
+        <p:nvPicPr>
+          <p:cNvPr id="90" name="Google Shape;90;p16" descr="metis-mini.png"/>
+          <p:cNvPicPr preferRelativeResize="0"/>
           <p:nvPr/>
-        </p:nvCxnSpPr>
+        </p:nvPicPr>
+        <p:blipFill rotWithShape="1">
+          <a:blip r:embed="rId7">
+            <a:alphaModFix amt="25000"/>
+          </a:blip>
+          <a:srcRect/>
+          <a:stretch/>
+        </p:blipFill>
         <p:spPr>
           <a:xfrm>
-            <a:off x="1213950" y="1454600"/>
-            <a:ext cx="6716100" cy="0"/>
+            <a:off x="8512774" y="290199"/>
+            <a:ext cx="326424" cy="384999"/>
           </a:xfrm>
-          <a:prstGeom prst="straightConnector1">
+          <a:prstGeom prst="rect">
             <a:avLst/>
           </a:prstGeom>
           <a:noFill/>
-          <a:ln w="19050" cap="flat" cmpd="sng">
-            <a:solidFill>
-              <a:srgbClr val="FFFFFF"/>
-            </a:solidFill>
-            <a:prstDash val="solid"/>
-            <a:round/>
-            <a:headEnd type="none" w="sm" len="sm"/>
-            <a:tailEnd type="none" w="sm" len="sm"/>
+          <a:ln>
+            <a:noFill/>
           </a:ln>
         </p:spPr>
-      </p:cxnSp>
+      </p:pic>
+      <p:pic>
+        <p:nvPicPr>
+          <p:cNvPr id="7" name="Google Shape;55;p13" descr="metis.png">
+            <a:extLst>
+              <a:ext uri="{FF2B5EF4-FFF2-40B4-BE49-F238E27FC236}">
+                <a16:creationId xmlns:a16="http://schemas.microsoft.com/office/drawing/2014/main" id="{6EA1ACA7-8895-C544-BCA8-7D5AEA516A15}"/>
+              </a:ext>
+            </a:extLst>
+          </p:cNvPr>
+          <p:cNvPicPr preferRelativeResize="0"/>
+          <p:nvPr/>
+        </p:nvPicPr>
+        <p:blipFill rotWithShape="1">
+          <a:blip r:embed="rId8">
+            <a:alphaModFix/>
+          </a:blip>
+          <a:srcRect/>
+          <a:stretch/>
+        </p:blipFill>
+        <p:spPr>
+          <a:xfrm>
+            <a:off x="7526348" y="1908227"/>
+            <a:ext cx="1312850" cy="2100524"/>
+          </a:xfrm>
+          <a:prstGeom prst="rect">
+            <a:avLst/>
+          </a:prstGeom>
+          <a:solidFill>
+            <a:schemeClr val="bg1"/>
+          </a:solidFill>
+          <a:ln>
+            <a:noFill/>
+          </a:ln>
+        </p:spPr>
+      </p:pic>
     </p:spTree>
+    <p:extLst>
+      <p:ext uri="{BB962C8B-B14F-4D97-AF65-F5344CB8AC3E}">
+        <p14:creationId xmlns:p14="http://schemas.microsoft.com/office/powerpoint/2010/main" val="2625748556"/>
+      </p:ext>
+    </p:extLst>
   </p:cSld>
   <p:clrMapOvr>
     <a:masterClrMapping/>

</xml_diff>